<commit_message>
ajout des commentaire pour l'approche de la problématique
</commit_message>
<xml_diff>
--- a/presentation/GraphY.pptx
+++ b/presentation/GraphY.pptx
@@ -124,6 +124,18 @@
 </p:presentation>
 </file>
 
+<file path=ppt/commentAuthors.xml><?xml version="1.0" encoding="utf-8"?>
+<p:cmAuthorLst xmlns:a="http://schemas.openxmlformats.org/drawingml/2006/main" xmlns:r="http://schemas.openxmlformats.org/officeDocument/2006/relationships" xmlns:p="http://schemas.openxmlformats.org/presentationml/2006/main">
+  <p:cmAuthor id="1" name="Patrick Deslé Djomo" initials="PDD" lastIdx="3" clrIdx="0">
+    <p:extLst>
+      <p:ext uri="{19B8F6BF-5375-455C-9EA6-DF929625EA0E}">
+        <p15:presenceInfo xmlns:p15="http://schemas.microsoft.com/office/powerpoint/2012/main" userId="83454cb298a537fa" providerId="Windows Live"/>
+      </p:ext>
+    </p:extLst>
+  </p:cmAuthor>
+</p:cmAuthorLst>
+</file>
+
 <file path=ppt/notesMasters/notesMaster1.xml><?xml version="1.0" encoding="utf-8"?>
 <p:notesMaster xmlns:a="http://schemas.openxmlformats.org/drawingml/2006/main" xmlns:r="http://schemas.openxmlformats.org/officeDocument/2006/relationships" xmlns:p="http://schemas.openxmlformats.org/presentationml/2006/main">
   <p:cSld>
@@ -206,7 +218,7 @@
           <a:p>
             <a:fld id="{AF28B09F-0466-45BE-9E78-25D72A7FABFF}" type="datetimeFigureOut">
               <a:rPr lang="fr-CH" smtClean="0"/>
-              <a:t>03.06.2016</a:t>
+              <a:t>06.06.2016</a:t>
             </a:fld>
             <a:endParaRPr lang="fr-CH" dirty="0"/>
           </a:p>
@@ -365,7 +377,7 @@
           <a:p>
             <a:fld id="{135558CC-D944-408D-80C8-CC88573B5A11}" type="slidenum">
               <a:rPr lang="fr-CH" smtClean="0"/>
-              <a:t>‹#›</a:t>
+              <a:t>‹N°›</a:t>
             </a:fld>
             <a:endParaRPr lang="fr-CH" dirty="0"/>
           </a:p>
@@ -642,6 +654,169 @@
 </p:notes>
 </file>
 
+<file path=ppt/notesSlides/notesSlide3.xml><?xml version="1.0" encoding="utf-8"?>
+<p:notes xmlns:a="http://schemas.openxmlformats.org/drawingml/2006/main" xmlns:r="http://schemas.openxmlformats.org/officeDocument/2006/relationships" xmlns:p="http://schemas.openxmlformats.org/presentationml/2006/main">
+  <p:cSld>
+    <p:spTree>
+      <p:nvGrpSpPr>
+        <p:cNvPr id="1" name=""/>
+        <p:cNvGrpSpPr/>
+        <p:nvPr/>
+      </p:nvGrpSpPr>
+      <p:grpSpPr>
+        <a:xfrm>
+          <a:off x="0" y="0"/>
+          <a:ext cx="0" cy="0"/>
+          <a:chOff x="0" y="0"/>
+          <a:chExt cx="0" cy="0"/>
+        </a:xfrm>
+      </p:grpSpPr>
+      <p:sp>
+        <p:nvSpPr>
+          <p:cNvPr id="2" name="Espace réservé de l'image des diapositives 1"/>
+          <p:cNvSpPr>
+            <a:spLocks noGrp="1" noRot="1" noChangeAspect="1"/>
+          </p:cNvSpPr>
+          <p:nvPr>
+            <p:ph type="sldImg"/>
+          </p:nvPr>
+        </p:nvSpPr>
+        <p:spPr/>
+      </p:sp>
+      <p:sp>
+        <p:nvSpPr>
+          <p:cNvPr id="3" name="Espace réservé des commentaires 2"/>
+          <p:cNvSpPr>
+            <a:spLocks noGrp="1"/>
+          </p:cNvSpPr>
+          <p:nvPr>
+            <p:ph type="body" idx="1"/>
+          </p:nvPr>
+        </p:nvSpPr>
+        <p:spPr/>
+        <p:txBody>
+          <a:bodyPr/>
+          <a:lstStyle/>
+          <a:p>
+            <a:r>
+              <a:rPr lang="fr-CH" dirty="0" smtClean="0"/>
+              <a:t>-Tout d'abord, nous avons divisé le projet en sous couches donc on</a:t>
+            </a:r>
+            <a:r>
+              <a:rPr lang="fr-CH" baseline="0" dirty="0" smtClean="0"/>
+              <a:t> reviendra dessus dans le slide qui suit</a:t>
+            </a:r>
+            <a:r>
+              <a:rPr lang="fr-CH" dirty="0" smtClean="0"/>
+              <a:t>.</a:t>
+            </a:r>
+          </a:p>
+          <a:p>
+            <a:r>
+              <a:rPr lang="fr-CH" dirty="0" smtClean="0"/>
+              <a:t>-ensuite</a:t>
+            </a:r>
+            <a:r>
+              <a:rPr lang="fr-CH" baseline="0" dirty="0" smtClean="0"/>
+              <a:t> nous avons utilisé le pattern </a:t>
+            </a:r>
+            <a:r>
+              <a:rPr lang="fr-CH" baseline="0" dirty="0" err="1" smtClean="0"/>
+              <a:t>visitor</a:t>
+            </a:r>
+            <a:r>
+              <a:rPr lang="fr-CH" baseline="0" dirty="0" smtClean="0"/>
+              <a:t> pour implémenter nos algorithmes.</a:t>
+            </a:r>
+          </a:p>
+          <a:p>
+            <a:r>
+              <a:rPr lang="fr-CH" baseline="0" dirty="0" smtClean="0"/>
+              <a:t>-L’application a été </a:t>
+            </a:r>
+            <a:r>
+              <a:rPr lang="fr-CH" baseline="0" dirty="0" err="1" smtClean="0"/>
+              <a:t>dévéloppée</a:t>
+            </a:r>
+            <a:r>
+              <a:rPr lang="fr-CH" baseline="0" dirty="0" smtClean="0"/>
+              <a:t> en </a:t>
+            </a:r>
+            <a:r>
+              <a:rPr lang="fr-CH" baseline="0" dirty="0" err="1" smtClean="0"/>
+              <a:t>c++</a:t>
+            </a:r>
+            <a:r>
+              <a:rPr lang="fr-CH" baseline="0" dirty="0" smtClean="0"/>
+              <a:t>11 standard avec la </a:t>
+            </a:r>
+            <a:r>
+              <a:rPr lang="fr-CH" baseline="0" dirty="0" err="1" smtClean="0"/>
+              <a:t>biblothèque</a:t>
+            </a:r>
+            <a:r>
+              <a:rPr lang="fr-CH" baseline="0" dirty="0" smtClean="0"/>
+              <a:t> qt5. </a:t>
+            </a:r>
+            <a:r>
+              <a:rPr lang="fr-CH" baseline="0" smtClean="0"/>
+              <a:t>par ailleurs</a:t>
+            </a:r>
+            <a:r>
+              <a:rPr lang="fr-CH" baseline="0" dirty="0" smtClean="0"/>
+              <a:t>, nous aussi utilisé </a:t>
+            </a:r>
+            <a:r>
+              <a:rPr lang="fr-CH" baseline="0" dirty="0" err="1" smtClean="0"/>
+              <a:t>Boost.Spirit</a:t>
+            </a:r>
+            <a:r>
+              <a:rPr lang="fr-CH" baseline="0" dirty="0" smtClean="0"/>
+              <a:t> pour implémenter le parseur.</a:t>
+            </a:r>
+            <a:endParaRPr lang="fr-CH" dirty="0" smtClean="0"/>
+          </a:p>
+          <a:p>
+            <a:endParaRPr lang="fr-CH" dirty="0"/>
+          </a:p>
+        </p:txBody>
+      </p:sp>
+      <p:sp>
+        <p:nvSpPr>
+          <p:cNvPr id="4" name="Espace réservé du numéro de diapositive 3"/>
+          <p:cNvSpPr>
+            <a:spLocks noGrp="1"/>
+          </p:cNvSpPr>
+          <p:nvPr>
+            <p:ph type="sldNum" sz="quarter" idx="10"/>
+          </p:nvPr>
+        </p:nvSpPr>
+        <p:spPr/>
+        <p:txBody>
+          <a:bodyPr/>
+          <a:lstStyle/>
+          <a:p>
+            <a:fld id="{135558CC-D944-408D-80C8-CC88573B5A11}" type="slidenum">
+              <a:rPr lang="fr-CH" smtClean="0"/>
+              <a:t>4</a:t>
+            </a:fld>
+            <a:endParaRPr lang="fr-CH" dirty="0"/>
+          </a:p>
+        </p:txBody>
+      </p:sp>
+    </p:spTree>
+    <p:extLst>
+      <p:ext uri="{BB962C8B-B14F-4D97-AF65-F5344CB8AC3E}">
+        <p14:creationId xmlns:p14="http://schemas.microsoft.com/office/powerpoint/2010/main" val="1473012900"/>
+      </p:ext>
+    </p:extLst>
+  </p:cSld>
+  <p:clrMapOvr>
+    <a:masterClrMapping/>
+  </p:clrMapOvr>
+</p:notes>
+</file>
+
 <file path=ppt/slideLayouts/slideLayout1.xml><?xml version="1.0" encoding="utf-8"?>
 <p:sldLayout xmlns:a="http://schemas.openxmlformats.org/drawingml/2006/main" xmlns:r="http://schemas.openxmlformats.org/officeDocument/2006/relationships" xmlns:p="http://schemas.openxmlformats.org/presentationml/2006/main" type="title" preserve="1">
   <p:cSld name="Diapositive de titre">
@@ -808,7 +983,7 @@
             <a:fld id="{D57F1E4F-1CFF-5643-939E-217C01CDF565}" type="slidenum">
               <a:rPr lang="en-US" smtClean="0"/>
               <a:pPr/>
-              <a:t>‹#›</a:t>
+              <a:t>‹N°›</a:t>
             </a:fld>
             <a:endParaRPr lang="en-US" dirty="0"/>
           </a:p>
@@ -943,7 +1118,7 @@
           <a:p>
             <a:fld id="{43C76626-FBB6-4B40-9410-F3906EB18262}" type="datetime1">
               <a:rPr lang="en-US" smtClean="0"/>
-              <a:t>6/3/2016</a:t>
+              <a:t>6/6/2016</a:t>
             </a:fld>
             <a:endParaRPr lang="en-US" dirty="0"/>
           </a:p>
@@ -990,7 +1165,7 @@
             <a:fld id="{D57F1E4F-1CFF-5643-939E-217C01CDF565}" type="slidenum">
               <a:rPr lang="en-US" smtClean="0"/>
               <a:pPr/>
-              <a:t>‹#›</a:t>
+              <a:t>‹N°›</a:t>
             </a:fld>
             <a:endParaRPr lang="en-US" dirty="0"/>
           </a:p>
@@ -1128,7 +1303,7 @@
           <a:p>
             <a:fld id="{64691CF2-69BD-4C27-A2C7-A5FA9A447048}" type="datetime1">
               <a:rPr lang="en-US" smtClean="0"/>
-              <a:t>6/3/2016</a:t>
+              <a:t>6/6/2016</a:t>
             </a:fld>
             <a:endParaRPr lang="en-US" dirty="0"/>
           </a:p>
@@ -1175,7 +1350,7 @@
             <a:fld id="{D57F1E4F-1CFF-5643-939E-217C01CDF565}" type="slidenum">
               <a:rPr lang="en-US" smtClean="0"/>
               <a:pPr/>
-              <a:t>‹#›</a:t>
+              <a:t>‹N°›</a:t>
             </a:fld>
             <a:endParaRPr lang="en-US" dirty="0"/>
           </a:p>
@@ -1303,7 +1478,7 @@
           <a:p>
             <a:fld id="{D6041FA5-4C6C-4B89-B1D2-82A8EB895517}" type="datetime1">
               <a:rPr lang="en-US" smtClean="0"/>
-              <a:t>6/3/2016</a:t>
+              <a:t>6/6/2016</a:t>
             </a:fld>
             <a:endParaRPr lang="en-US" dirty="0"/>
           </a:p>
@@ -1350,7 +1525,7 @@
             <a:fld id="{D57F1E4F-1CFF-5643-939E-217C01CDF565}" type="slidenum">
               <a:rPr lang="en-US" smtClean="0"/>
               <a:pPr/>
-              <a:t>‹#›</a:t>
+              <a:t>‹N°›</a:t>
             </a:fld>
             <a:endParaRPr lang="en-US" dirty="0"/>
           </a:p>
@@ -1596,7 +1771,7 @@
           <a:p>
             <a:fld id="{C397C25B-BBA8-48E4-AE3C-71FABF613F7F}" type="datetime1">
               <a:rPr lang="en-US" smtClean="0"/>
-              <a:t>6/3/2016</a:t>
+              <a:t>6/6/2016</a:t>
             </a:fld>
             <a:endParaRPr lang="en-US" dirty="0"/>
           </a:p>
@@ -1643,7 +1818,7 @@
             <a:fld id="{D57F1E4F-1CFF-5643-939E-217C01CDF565}" type="slidenum">
               <a:rPr lang="en-US" smtClean="0"/>
               <a:pPr/>
-              <a:t>‹#›</a:t>
+              <a:t>‹N°›</a:t>
             </a:fld>
             <a:endParaRPr lang="en-US" dirty="0"/>
           </a:p>
@@ -1870,7 +2045,7 @@
           <a:p>
             <a:fld id="{C100E2E5-07F4-4D03-A0CD-BC739D20CF20}" type="datetime1">
               <a:rPr lang="en-US" smtClean="0"/>
-              <a:t>6/3/2016</a:t>
+              <a:t>6/6/2016</a:t>
             </a:fld>
             <a:endParaRPr lang="en-US" dirty="0"/>
           </a:p>
@@ -1917,7 +2092,7 @@
             <a:fld id="{D57F1E4F-1CFF-5643-939E-217C01CDF565}" type="slidenum">
               <a:rPr lang="en-US" smtClean="0"/>
               <a:pPr/>
-              <a:t>‹#›</a:t>
+              <a:t>‹N°›</a:t>
             </a:fld>
             <a:endParaRPr lang="en-US" dirty="0"/>
           </a:p>
@@ -2259,7 +2434,7 @@
           <a:p>
             <a:fld id="{E8D126B3-5846-4974-AA8E-48CF87B745B2}" type="datetime1">
               <a:rPr lang="en-US" smtClean="0"/>
-              <a:t>6/3/2016</a:t>
+              <a:t>6/6/2016</a:t>
             </a:fld>
             <a:endParaRPr lang="en-US" dirty="0"/>
           </a:p>
@@ -2306,7 +2481,7 @@
             <a:fld id="{D57F1E4F-1CFF-5643-939E-217C01CDF565}" type="slidenum">
               <a:rPr lang="en-US" smtClean="0"/>
               <a:pPr/>
-              <a:t>‹#›</a:t>
+              <a:t>‹N°›</a:t>
             </a:fld>
             <a:endParaRPr lang="en-US" dirty="0"/>
           </a:p>
@@ -2419,7 +2594,7 @@
           <a:p>
             <a:fld id="{1BFEB80F-15BA-446D-88FF-7F2FA067E768}" type="datetime1">
               <a:rPr lang="en-US" smtClean="0"/>
-              <a:t>6/3/2016</a:t>
+              <a:t>6/6/2016</a:t>
             </a:fld>
             <a:endParaRPr lang="en-US" dirty="0"/>
           </a:p>
@@ -2466,7 +2641,7 @@
             <a:fld id="{D57F1E4F-1CFF-5643-939E-217C01CDF565}" type="slidenum">
               <a:rPr lang="en-US" smtClean="0"/>
               <a:pPr/>
-              <a:t>‹#›</a:t>
+              <a:t>‹N°›</a:t>
             </a:fld>
             <a:endParaRPr lang="en-US" dirty="0"/>
           </a:p>
@@ -2579,7 +2754,7 @@
           <a:p>
             <a:fld id="{19985235-57B9-420B-8A26-966C0A54D3C8}" type="datetime1">
               <a:rPr lang="en-US" smtClean="0"/>
-              <a:t>6/3/2016</a:t>
+              <a:t>6/6/2016</a:t>
             </a:fld>
             <a:endParaRPr lang="en-US" dirty="0"/>
           </a:p>
@@ -2626,7 +2801,7 @@
             <a:fld id="{D57F1E4F-1CFF-5643-939E-217C01CDF565}" type="slidenum">
               <a:rPr lang="en-US" smtClean="0"/>
               <a:pPr/>
-              <a:t>‹#›</a:t>
+              <a:t>‹N°›</a:t>
             </a:fld>
             <a:endParaRPr lang="en-US" dirty="0"/>
           </a:p>
@@ -2875,7 +3050,7 @@
           <a:p>
             <a:fld id="{9D6FD31D-1D97-42AB-8D33-C3831B8137FE}" type="datetime1">
               <a:rPr lang="en-US" smtClean="0"/>
-              <a:t>6/3/2016</a:t>
+              <a:t>6/6/2016</a:t>
             </a:fld>
             <a:endParaRPr lang="en-US" dirty="0"/>
           </a:p>
@@ -2922,7 +3097,7 @@
             <a:fld id="{D57F1E4F-1CFF-5643-939E-217C01CDF565}" type="slidenum">
               <a:rPr lang="en-US" smtClean="0"/>
               <a:pPr/>
-              <a:t>‹#›</a:t>
+              <a:t>‹N°›</a:t>
             </a:fld>
             <a:endParaRPr lang="en-US" dirty="0"/>
           </a:p>
@@ -3144,7 +3319,7 @@
           <a:p>
             <a:fld id="{1AA1D5F0-8E8E-4500-84C2-CE4F83C611F0}" type="datetime1">
               <a:rPr lang="en-US" smtClean="0"/>
-              <a:t>6/3/2016</a:t>
+              <a:t>6/6/2016</a:t>
             </a:fld>
             <a:endParaRPr lang="en-US" dirty="0"/>
           </a:p>
@@ -3191,7 +3366,7 @@
             <a:fld id="{D57F1E4F-1CFF-5643-939E-217C01CDF565}" type="slidenum">
               <a:rPr lang="en-US" smtClean="0"/>
               <a:pPr/>
-              <a:t>‹#›</a:t>
+              <a:t>‹N°›</a:t>
             </a:fld>
             <a:endParaRPr lang="en-US" dirty="0"/>
           </a:p>
@@ -3363,7 +3538,7 @@
           <a:p>
             <a:fld id="{3D30FC33-0DAA-4966-A924-06BA75148EF2}" type="datetime1">
               <a:rPr lang="en-US" smtClean="0"/>
-              <a:t>6/3/2016</a:t>
+              <a:t>6/6/2016</a:t>
             </a:fld>
             <a:endParaRPr lang="en-US" dirty="0"/>
           </a:p>
@@ -3447,7 +3622,7 @@
             <a:fld id="{D57F1E4F-1CFF-5643-939E-217C01CDF565}" type="slidenum">
               <a:rPr lang="en-US" smtClean="0"/>
               <a:pPr/>
-              <a:t>‹#›</a:t>
+              <a:t>‹N°›</a:t>
             </a:fld>
             <a:endParaRPr lang="en-US" dirty="0"/>
           </a:p>
@@ -3816,30 +3991,14 @@
           <a:p>
             <a:r>
               <a:rPr lang="fr-CH" dirty="0" smtClean="0"/>
-              <a:t>Browne </a:t>
-            </a:r>
+              <a:t>Browne Champion Djomo Hardy Richoz Rochat</a:t>
+            </a:r>
+            <a:endParaRPr lang="fr-CH" dirty="0"/>
+          </a:p>
+          <a:p>
             <a:r>
               <a:rPr lang="fr-CH" dirty="0" smtClean="0"/>
-              <a:t>Champion Djomo </a:t>
-            </a:r>
-            <a:r>
-              <a:rPr lang="fr-CH" dirty="0" smtClean="0"/>
-              <a:t>Hardy Richoz </a:t>
-            </a:r>
-            <a:r>
-              <a:rPr lang="fr-CH" dirty="0" smtClean="0"/>
-              <a:t>Rochat</a:t>
-            </a:r>
-            <a:endParaRPr lang="fr-CH" dirty="0"/>
-          </a:p>
-          <a:p>
-            <a:r>
-              <a:rPr lang="fr-CH" dirty="0" smtClean="0"/>
-              <a:t>Resp</a:t>
-            </a:r>
-            <a:r>
-              <a:rPr lang="fr-CH" dirty="0" smtClean="0"/>
-              <a:t>. René Rentsch</a:t>
+              <a:t>Resp. René Rentsch</a:t>
             </a:r>
             <a:endParaRPr lang="fr-CH" dirty="0"/>
           </a:p>
@@ -4080,7 +4239,6 @@
               <a:rPr lang="fr-CH" dirty="0" smtClean="0"/>
               <a:t>Présentation du projet - Brain</a:t>
             </a:r>
-            <a:endParaRPr lang="fr-CH" dirty="0" smtClean="0"/>
           </a:p>
           <a:p>
             <a:r>
@@ -4095,18 +4253,12 @@
               <a:rPr lang="fr-CH" dirty="0" smtClean="0"/>
               <a:t> jojo</a:t>
             </a:r>
-            <a:endParaRPr lang="fr-CH" dirty="0" smtClean="0"/>
           </a:p>
           <a:p>
             <a:r>
               <a:rPr lang="fr-CH" dirty="0" smtClean="0"/>
-              <a:t>Architecture </a:t>
-            </a:r>
-            <a:r>
-              <a:rPr lang="fr-CH" dirty="0" smtClean="0"/>
-              <a:t>de l’application - Champignon</a:t>
-            </a:r>
-            <a:endParaRPr lang="fr-CH" dirty="0" smtClean="0"/>
+              <a:t>Architecture de l’application - Champignon</a:t>
+            </a:r>
           </a:p>
           <a:p>
             <a:r>
@@ -4117,16 +4269,11 @@
               <a:rPr lang="fr-CH" dirty="0" smtClean="0"/>
               <a:t>ifficultés rencontrées – Riz chaud</a:t>
             </a:r>
-            <a:endParaRPr lang="fr-CH" dirty="0" smtClean="0"/>
           </a:p>
           <a:p>
             <a:r>
               <a:rPr lang="fr-CH" dirty="0" smtClean="0"/>
-              <a:t>Problèmes </a:t>
-            </a:r>
-            <a:r>
-              <a:rPr lang="fr-CH" dirty="0" smtClean="0"/>
-              <a:t>connus - Ronchon</a:t>
+              <a:t>Problèmes connus - Ronchon</a:t>
             </a:r>
           </a:p>
           <a:p>
@@ -4145,7 +4292,6 @@
               <a:rPr lang="fr-CH" dirty="0" smtClean="0"/>
               <a:t>Conclusion - Brain</a:t>
             </a:r>
-            <a:endParaRPr lang="fr-CH" dirty="0" smtClean="0"/>
           </a:p>
           <a:p>
             <a:pPr lvl="1"/>
@@ -4504,7 +4650,6 @@
               <a:rPr lang="fr-CH" dirty="0" smtClean="0"/>
               <a:t>HTML</a:t>
             </a:r>
-            <a:endParaRPr lang="fr-CH" dirty="0" smtClean="0"/>
           </a:p>
         </p:txBody>
       </p:sp>
@@ -4817,7 +4962,6 @@
               <a:rPr lang="fr-CH" dirty="0" smtClean="0"/>
               <a:t>Beaucoup de choix </a:t>
             </a:r>
-            <a:endParaRPr lang="fr-CH" dirty="0" smtClean="0"/>
           </a:p>
           <a:p>
             <a:r>

</xml_diff>

<commit_message>
added comment to presentation.pptx
</commit_message>
<xml_diff>
--- a/presentation/GraphY.pptx
+++ b/presentation/GraphY.pptx
@@ -377,7 +377,7 @@
           <a:p>
             <a:fld id="{135558CC-D944-408D-80C8-CC88573B5A11}" type="slidenum">
               <a:rPr lang="fr-CH" smtClean="0"/>
-              <a:t>‹N°›</a:t>
+              <a:t>‹#›</a:t>
             </a:fld>
             <a:endParaRPr lang="fr-CH" dirty="0"/>
           </a:p>
@@ -614,6 +614,70 @@
           <a:bodyPr/>
           <a:lstStyle/>
           <a:p>
+            <a:r>
+              <a:rPr lang="fr-CH" dirty="0" smtClean="0"/>
+              <a:t>Présentation du projet - Browne</a:t>
+            </a:r>
+          </a:p>
+          <a:p>
+            <a:r>
+              <a:rPr lang="fr-CH" dirty="0" smtClean="0"/>
+              <a:t>Approche de la problématique – </a:t>
+            </a:r>
+            <a:r>
+              <a:rPr lang="fr-CH" dirty="0" err="1" smtClean="0"/>
+              <a:t>Djomo</a:t>
+            </a:r>
+            <a:endParaRPr lang="fr-CH" dirty="0" smtClean="0"/>
+          </a:p>
+          <a:p>
+            <a:r>
+              <a:rPr lang="fr-CH" dirty="0" smtClean="0"/>
+              <a:t>Architecture de l’application - Champion</a:t>
+            </a:r>
+          </a:p>
+          <a:p>
+            <a:r>
+              <a:rPr lang="fr-CH" dirty="0" smtClean="0"/>
+              <a:t>Difficultés rencontrées – </a:t>
+            </a:r>
+            <a:r>
+              <a:rPr lang="fr-CH" dirty="0" err="1" smtClean="0"/>
+              <a:t>Richoz</a:t>
+            </a:r>
+            <a:endParaRPr lang="fr-CH" dirty="0" smtClean="0"/>
+          </a:p>
+          <a:p>
+            <a:r>
+              <a:rPr lang="fr-CH" dirty="0" smtClean="0"/>
+              <a:t>Problèmes connus - </a:t>
+            </a:r>
+            <a:r>
+              <a:rPr lang="fr-CH" dirty="0" err="1" smtClean="0"/>
+              <a:t>Rochat</a:t>
+            </a:r>
+            <a:endParaRPr lang="fr-CH" dirty="0" smtClean="0"/>
+          </a:p>
+          <a:p>
+            <a:r>
+              <a:rPr lang="fr-CH" dirty="0" smtClean="0"/>
+              <a:t>Améliorations - Hardy</a:t>
+            </a:r>
+          </a:p>
+          <a:p>
+            <a:r>
+              <a:rPr lang="fr-CH" dirty="0" smtClean="0"/>
+              <a:t>Conclusion - Browne</a:t>
+            </a:r>
+          </a:p>
+          <a:p>
+            <a:pPr lvl="1"/>
+            <a:r>
+              <a:rPr lang="fr-CH" dirty="0" smtClean="0"/>
+              <a:t>Démonstration</a:t>
+            </a:r>
+          </a:p>
+          <a:p>
             <a:endParaRPr lang="fr-FR" dirty="0"/>
           </a:p>
         </p:txBody>
@@ -635,7 +699,7 @@
           <a:p>
             <a:fld id="{135558CC-D944-408D-80C8-CC88573B5A11}" type="slidenum">
               <a:rPr lang="fr-CH" smtClean="0"/>
-              <a:t>3</a:t>
+              <a:t>2</a:t>
             </a:fld>
             <a:endParaRPr lang="fr-CH" dirty="0"/>
           </a:p>
@@ -644,7 +708,7 @@
     </p:spTree>
     <p:extLst>
       <p:ext uri="{BB962C8B-B14F-4D97-AF65-F5344CB8AC3E}">
-        <p14:creationId xmlns:p14="http://schemas.microsoft.com/office/powerpoint/2010/main" val="3227801442"/>
+        <p14:creationId xmlns:p14="http://schemas.microsoft.com/office/powerpoint/2010/main" val="2504804725"/>
       </p:ext>
     </p:extLst>
   </p:cSld>
@@ -673,7 +737,7 @@
       </p:grpSpPr>
       <p:sp>
         <p:nvSpPr>
-          <p:cNvPr id="2" name="Espace réservé de l'image des diapositives 1"/>
+          <p:cNvPr id="2" name="Slide Image Placeholder 1"/>
           <p:cNvSpPr>
             <a:spLocks noGrp="1" noRot="1" noChangeAspect="1"/>
           </p:cNvSpPr>
@@ -685,7 +749,7 @@
       </p:sp>
       <p:sp>
         <p:nvSpPr>
-          <p:cNvPr id="3" name="Espace réservé des commentaires 2"/>
+          <p:cNvPr id="3" name="Notes Placeholder 2"/>
           <p:cNvSpPr>
             <a:spLocks noGrp="1"/>
           </p:cNvSpPr>
@@ -699,91 +763,28 @@
           <a:lstStyle/>
           <a:p>
             <a:r>
-              <a:rPr lang="fr-CH" dirty="0" smtClean="0"/>
-              <a:t>-Tout d'abord, nous avons divisé le projet en sous couches donc on</a:t>
-            </a:r>
-            <a:r>
-              <a:rPr lang="fr-CH" baseline="0" dirty="0" smtClean="0"/>
-              <a:t> reviendra dessus dans le slide qui suit</a:t>
-            </a:r>
-            <a:r>
-              <a:rPr lang="fr-CH" dirty="0" smtClean="0"/>
-              <a:t>.</a:t>
-            </a:r>
-          </a:p>
-          <a:p>
-            <a:r>
-              <a:rPr lang="fr-CH" dirty="0" smtClean="0"/>
-              <a:t>-ensuite</a:t>
-            </a:r>
-            <a:r>
-              <a:rPr lang="fr-CH" baseline="0" dirty="0" smtClean="0"/>
-              <a:t> nous avons utilisé le pattern </a:t>
-            </a:r>
-            <a:r>
-              <a:rPr lang="fr-CH" baseline="0" dirty="0" err="1" smtClean="0"/>
-              <a:t>visitor</a:t>
-            </a:r>
-            <a:r>
-              <a:rPr lang="fr-CH" baseline="0" dirty="0" smtClean="0"/>
-              <a:t> pour implémenter nos algorithmes.</a:t>
-            </a:r>
-          </a:p>
-          <a:p>
-            <a:r>
-              <a:rPr lang="fr-CH" baseline="0" dirty="0" smtClean="0"/>
-              <a:t>-L’application a été </a:t>
-            </a:r>
-            <a:r>
-              <a:rPr lang="fr-CH" baseline="0" dirty="0" err="1" smtClean="0"/>
-              <a:t>dévéloppée</a:t>
-            </a:r>
-            <a:r>
-              <a:rPr lang="fr-CH" baseline="0" dirty="0" smtClean="0"/>
-              <a:t> en </a:t>
-            </a:r>
-            <a:r>
-              <a:rPr lang="fr-CH" baseline="0" dirty="0" err="1" smtClean="0"/>
-              <a:t>c++</a:t>
-            </a:r>
-            <a:r>
-              <a:rPr lang="fr-CH" baseline="0" dirty="0" smtClean="0"/>
-              <a:t>11 standard avec la </a:t>
-            </a:r>
-            <a:r>
-              <a:rPr lang="fr-CH" baseline="0" dirty="0" err="1" smtClean="0"/>
-              <a:t>biblothèque</a:t>
-            </a:r>
-            <a:r>
-              <a:rPr lang="fr-CH" baseline="0" dirty="0" smtClean="0"/>
-              <a:t> qt5. </a:t>
-            </a:r>
-            <a:r>
-              <a:rPr lang="fr-CH" baseline="0" smtClean="0"/>
-              <a:t>par ailleurs</a:t>
-            </a:r>
-            <a:r>
-              <a:rPr lang="fr-CH" baseline="0" dirty="0" smtClean="0"/>
-              <a:t>, nous aussi utilisé </a:t>
-            </a:r>
-            <a:r>
-              <a:rPr lang="fr-CH" baseline="0" dirty="0" err="1" smtClean="0"/>
-              <a:t>Boost.Spirit</a:t>
-            </a:r>
-            <a:r>
-              <a:rPr lang="fr-CH" baseline="0" dirty="0" smtClean="0"/>
-              <a:t> pour implémenter le parseur.</a:t>
-            </a:r>
-            <a:endParaRPr lang="fr-CH" dirty="0" smtClean="0"/>
-          </a:p>
-          <a:p>
-            <a:endParaRPr lang="fr-CH" dirty="0"/>
-          </a:p>
-        </p:txBody>
-      </p:sp>
-      <p:sp>
-        <p:nvSpPr>
-          <p:cNvPr id="4" name="Espace réservé du numéro de diapositive 3"/>
+              <a:rPr lang="fr-FR" dirty="0" smtClean="0"/>
+              <a:t>-&gt;</a:t>
+            </a:r>
+            <a:r>
+              <a:rPr lang="fr-FR" dirty="0" err="1" smtClean="0"/>
+              <a:t>Djomo</a:t>
+            </a:r>
+            <a:r>
+              <a:rPr lang="fr-FR" dirty="0" smtClean="0"/>
+              <a:t> :</a:t>
+            </a:r>
+            <a:r>
+              <a:rPr lang="fr-FR" baseline="0" dirty="0" smtClean="0"/>
+              <a:t> Approche de la problématique</a:t>
+            </a:r>
+            <a:endParaRPr lang="fr-FR" dirty="0"/>
+          </a:p>
+        </p:txBody>
+      </p:sp>
+      <p:sp>
+        <p:nvSpPr>
+          <p:cNvPr id="4" name="Slide Number Placeholder 3"/>
           <p:cNvSpPr>
             <a:spLocks noGrp="1"/>
           </p:cNvSpPr>
@@ -798,7 +799,7 @@
           <a:p>
             <a:fld id="{135558CC-D944-408D-80C8-CC88573B5A11}" type="slidenum">
               <a:rPr lang="fr-CH" smtClean="0"/>
-              <a:t>4</a:t>
+              <a:t>3</a:t>
             </a:fld>
             <a:endParaRPr lang="fr-CH" dirty="0"/>
           </a:p>
@@ -807,7 +808,7 @@
     </p:spTree>
     <p:extLst>
       <p:ext uri="{BB962C8B-B14F-4D97-AF65-F5344CB8AC3E}">
-        <p14:creationId xmlns:p14="http://schemas.microsoft.com/office/powerpoint/2010/main" val="1473012900"/>
+        <p14:creationId xmlns:p14="http://schemas.microsoft.com/office/powerpoint/2010/main" val="3227801442"/>
       </p:ext>
     </p:extLst>
   </p:cSld>
@@ -861,48 +862,85 @@
           <a:bodyPr/>
           <a:lstStyle/>
           <a:p>
-            <a:pPr marL="171450" indent="-171450">
-              <a:buFontTx/>
-              <a:buChar char="-"/>
-            </a:pPr>
             <a:r>
               <a:rPr lang="fr-CH" dirty="0" smtClean="0"/>
-              <a:t>Expliquer chaque</a:t>
+              <a:t>-Tout d'abord, nous avons divisé le projet en sous couches donc on</a:t>
             </a:r>
             <a:r>
               <a:rPr lang="fr-CH" baseline="0" dirty="0" smtClean="0"/>
-              <a:t> couche</a:t>
-            </a:r>
-          </a:p>
-          <a:p>
-            <a:pPr marL="628650" lvl="1" indent="-171450">
-              <a:buFontTx/>
-              <a:buChar char="-"/>
-            </a:pPr>
+              <a:t> reviendra dessus dans le slide qui suit</a:t>
+            </a:r>
+            <a:r>
+              <a:rPr lang="fr-CH" dirty="0" smtClean="0"/>
+              <a:t>.</a:t>
+            </a:r>
+          </a:p>
+          <a:p>
+            <a:r>
+              <a:rPr lang="fr-CH" dirty="0" smtClean="0"/>
+              <a:t>-ensuite</a:t>
+            </a:r>
             <a:r>
               <a:rPr lang="fr-CH" baseline="0" dirty="0" smtClean="0"/>
-              <a:t>Et ses dépendances</a:t>
-            </a:r>
-          </a:p>
-          <a:p>
-            <a:pPr marL="171450" lvl="0" indent="-171450">
-              <a:buFontTx/>
-              <a:buChar char="-"/>
-            </a:pPr>
+              <a:t> nous avons utilisé le pattern </a:t>
+            </a:r>
+            <a:r>
+              <a:rPr lang="fr-CH" baseline="0" dirty="0" err="1" smtClean="0"/>
+              <a:t>visitor</a:t>
+            </a:r>
             <a:r>
               <a:rPr lang="fr-CH" baseline="0" dirty="0" smtClean="0"/>
-              <a:t>Expliquer la réutilisabilité</a:t>
-            </a:r>
-          </a:p>
-          <a:p>
-            <a:pPr marL="628650" lvl="1" indent="-171450">
-              <a:buFontTx/>
-              <a:buChar char="-"/>
-            </a:pPr>
+              <a:t> pour implémenter nos algorithmes.</a:t>
+            </a:r>
+          </a:p>
+          <a:p>
             <a:r>
               <a:rPr lang="fr-CH" baseline="0" dirty="0" smtClean="0"/>
-              <a:t>Pour chaque couche</a:t>
-            </a:r>
+              <a:t>-L’application a été </a:t>
+            </a:r>
+            <a:r>
+              <a:rPr lang="fr-CH" baseline="0" dirty="0" err="1" smtClean="0"/>
+              <a:t>dévéloppée</a:t>
+            </a:r>
+            <a:r>
+              <a:rPr lang="fr-CH" baseline="0" dirty="0" smtClean="0"/>
+              <a:t> en </a:t>
+            </a:r>
+            <a:r>
+              <a:rPr lang="fr-CH" baseline="0" dirty="0" err="1" smtClean="0"/>
+              <a:t>c++</a:t>
+            </a:r>
+            <a:r>
+              <a:rPr lang="fr-CH" baseline="0" dirty="0" smtClean="0"/>
+              <a:t>11 standard avec la </a:t>
+            </a:r>
+            <a:r>
+              <a:rPr lang="fr-CH" baseline="0" dirty="0" err="1" smtClean="0"/>
+              <a:t>biblothèque</a:t>
+            </a:r>
+            <a:r>
+              <a:rPr lang="fr-CH" baseline="0" dirty="0" smtClean="0"/>
+              <a:t> qt5. </a:t>
+            </a:r>
+            <a:r>
+              <a:rPr lang="fr-CH" baseline="0" smtClean="0"/>
+              <a:t>par ailleurs</a:t>
+            </a:r>
+            <a:r>
+              <a:rPr lang="fr-CH" baseline="0" dirty="0" smtClean="0"/>
+              <a:t>, nous aussi utilisé </a:t>
+            </a:r>
+            <a:r>
+              <a:rPr lang="fr-CH" baseline="0" dirty="0" err="1" smtClean="0"/>
+              <a:t>Boost.Spirit</a:t>
+            </a:r>
+            <a:r>
+              <a:rPr lang="fr-CH" baseline="0" dirty="0" smtClean="0"/>
+              <a:t> pour implémenter le parseur.</a:t>
+            </a:r>
+            <a:endParaRPr lang="fr-CH" dirty="0" smtClean="0"/>
+          </a:p>
+          <a:p>
             <a:endParaRPr lang="fr-CH" dirty="0"/>
           </a:p>
         </p:txBody>
@@ -924,7 +962,7 @@
           <a:p>
             <a:fld id="{135558CC-D944-408D-80C8-CC88573B5A11}" type="slidenum">
               <a:rPr lang="fr-CH" smtClean="0"/>
-              <a:t>5</a:t>
+              <a:t>4</a:t>
             </a:fld>
             <a:endParaRPr lang="fr-CH" dirty="0"/>
           </a:p>
@@ -933,7 +971,7 @@
     </p:spTree>
     <p:extLst>
       <p:ext uri="{BB962C8B-B14F-4D97-AF65-F5344CB8AC3E}">
-        <p14:creationId xmlns:p14="http://schemas.microsoft.com/office/powerpoint/2010/main" val="3077873374"/>
+        <p14:creationId xmlns:p14="http://schemas.microsoft.com/office/powerpoint/2010/main" val="1473012900"/>
       </p:ext>
     </p:extLst>
   </p:cSld>
@@ -987,71 +1025,47 @@
           <a:bodyPr/>
           <a:lstStyle/>
           <a:p>
+            <a:pPr marL="171450" indent="-171450">
+              <a:buFontTx/>
+              <a:buChar char="-"/>
+            </a:pPr>
             <a:r>
               <a:rPr lang="fr-CH" dirty="0" smtClean="0"/>
-              <a:t>Apprentissage </a:t>
-            </a:r>
-            <a:r>
-              <a:rPr lang="fr-CH" dirty="0" err="1" smtClean="0"/>
-              <a:t>Qt</a:t>
-            </a:r>
-            <a:endParaRPr lang="fr-CH" dirty="0" smtClean="0"/>
-          </a:p>
-          <a:p>
-            <a:r>
-              <a:rPr lang="fr-CH" dirty="0" smtClean="0"/>
-              <a:t>    - Beaucoup de choix pour réaliser la même chose</a:t>
-            </a:r>
-          </a:p>
-          <a:p>
-            <a:r>
-              <a:rPr lang="fr-CH" dirty="0" smtClean="0"/>
-              <a:t>    - Perte de temps lorsqu’on part dans la mauvaise direction</a:t>
-            </a:r>
-          </a:p>
-          <a:p>
-            <a:endParaRPr lang="fr-CH" dirty="0" smtClean="0"/>
-          </a:p>
-          <a:p>
-            <a:r>
-              <a:rPr lang="fr-CH" dirty="0" smtClean="0"/>
-              <a:t>Conception plus longue que prévue</a:t>
-            </a:r>
-          </a:p>
-          <a:p>
-            <a:r>
-              <a:rPr lang="fr-CH" dirty="0" smtClean="0"/>
-              <a:t>    - Décalage des tâches</a:t>
-            </a:r>
-          </a:p>
-          <a:p>
-            <a:endParaRPr lang="fr-CH" dirty="0" smtClean="0"/>
-          </a:p>
-          <a:p>
-            <a:r>
-              <a:rPr lang="fr-CH" dirty="0" smtClean="0"/>
-              <a:t>Couche graphe sous-estimée</a:t>
-            </a:r>
-          </a:p>
-          <a:p>
-            <a:r>
-              <a:rPr lang="fr-CH" dirty="0" smtClean="0"/>
-              <a:t>    - conception faite et refaite car n’était pas optimale</a:t>
-            </a:r>
-          </a:p>
-          <a:p>
-            <a:endParaRPr lang="fr-CH" dirty="0" smtClean="0"/>
-          </a:p>
-          <a:p>
-            <a:r>
-              <a:rPr lang="fr-CH" dirty="0" smtClean="0"/>
-              <a:t>Mise en commun des différentes couches</a:t>
-            </a:r>
-          </a:p>
-          <a:p>
-            <a:r>
-              <a:rPr lang="fr-CH" dirty="0" smtClean="0"/>
-              <a:t>    - identifier la provenance des bugs occasionnés</a:t>
+              <a:t>Expliquer chaque</a:t>
+            </a:r>
+            <a:r>
+              <a:rPr lang="fr-CH" baseline="0" dirty="0" smtClean="0"/>
+              <a:t> couche</a:t>
+            </a:r>
+          </a:p>
+          <a:p>
+            <a:pPr marL="628650" lvl="1" indent="-171450">
+              <a:buFontTx/>
+              <a:buChar char="-"/>
+            </a:pPr>
+            <a:r>
+              <a:rPr lang="fr-CH" baseline="0" dirty="0" smtClean="0"/>
+              <a:t>Et ses dépendances</a:t>
+            </a:r>
+          </a:p>
+          <a:p>
+            <a:pPr marL="171450" lvl="0" indent="-171450">
+              <a:buFontTx/>
+              <a:buChar char="-"/>
+            </a:pPr>
+            <a:r>
+              <a:rPr lang="fr-CH" baseline="0" dirty="0" smtClean="0"/>
+              <a:t>Expliquer la réutilisabilité</a:t>
+            </a:r>
+          </a:p>
+          <a:p>
+            <a:pPr marL="628650" lvl="1" indent="-171450">
+              <a:buFontTx/>
+              <a:buChar char="-"/>
+            </a:pPr>
+            <a:r>
+              <a:rPr lang="fr-CH" baseline="0" dirty="0" smtClean="0"/>
+              <a:t>Pour chaque couche</a:t>
             </a:r>
             <a:endParaRPr lang="fr-CH" dirty="0"/>
           </a:p>
@@ -1074,7 +1088,7 @@
           <a:p>
             <a:fld id="{135558CC-D944-408D-80C8-CC88573B5A11}" type="slidenum">
               <a:rPr lang="fr-CH" smtClean="0"/>
-              <a:t>6</a:t>
+              <a:t>5</a:t>
             </a:fld>
             <a:endParaRPr lang="fr-CH" dirty="0"/>
           </a:p>
@@ -1083,7 +1097,7 @@
     </p:spTree>
     <p:extLst>
       <p:ext uri="{BB962C8B-B14F-4D97-AF65-F5344CB8AC3E}">
-        <p14:creationId xmlns:p14="http://schemas.microsoft.com/office/powerpoint/2010/main" val="1596446032"/>
+        <p14:creationId xmlns:p14="http://schemas.microsoft.com/office/powerpoint/2010/main" val="3077873374"/>
       </p:ext>
     </p:extLst>
   </p:cSld>
@@ -1139,6 +1153,156 @@
           <a:p>
             <a:r>
               <a:rPr lang="fr-CH" dirty="0" smtClean="0"/>
+              <a:t>Apprentissage </a:t>
+            </a:r>
+            <a:r>
+              <a:rPr lang="fr-CH" dirty="0" err="1" smtClean="0"/>
+              <a:t>Qt</a:t>
+            </a:r>
+            <a:endParaRPr lang="fr-CH" dirty="0" smtClean="0"/>
+          </a:p>
+          <a:p>
+            <a:r>
+              <a:rPr lang="fr-CH" dirty="0" smtClean="0"/>
+              <a:t>    - Beaucoup de choix pour réaliser la même chose</a:t>
+            </a:r>
+          </a:p>
+          <a:p>
+            <a:r>
+              <a:rPr lang="fr-CH" dirty="0" smtClean="0"/>
+              <a:t>    - Perte de temps lorsqu’on part dans la mauvaise direction</a:t>
+            </a:r>
+          </a:p>
+          <a:p>
+            <a:endParaRPr lang="fr-CH" dirty="0" smtClean="0"/>
+          </a:p>
+          <a:p>
+            <a:r>
+              <a:rPr lang="fr-CH" dirty="0" smtClean="0"/>
+              <a:t>Conception plus longue que prévue</a:t>
+            </a:r>
+          </a:p>
+          <a:p>
+            <a:r>
+              <a:rPr lang="fr-CH" dirty="0" smtClean="0"/>
+              <a:t>    - Décalage des tâches</a:t>
+            </a:r>
+          </a:p>
+          <a:p>
+            <a:endParaRPr lang="fr-CH" dirty="0" smtClean="0"/>
+          </a:p>
+          <a:p>
+            <a:r>
+              <a:rPr lang="fr-CH" dirty="0" smtClean="0"/>
+              <a:t>Couche graphe sous-estimée</a:t>
+            </a:r>
+          </a:p>
+          <a:p>
+            <a:r>
+              <a:rPr lang="fr-CH" dirty="0" smtClean="0"/>
+              <a:t>    - conception faite et refaite car n’était pas optimale</a:t>
+            </a:r>
+          </a:p>
+          <a:p>
+            <a:endParaRPr lang="fr-CH" dirty="0" smtClean="0"/>
+          </a:p>
+          <a:p>
+            <a:r>
+              <a:rPr lang="fr-CH" dirty="0" smtClean="0"/>
+              <a:t>Mise en commun des différentes couches</a:t>
+            </a:r>
+          </a:p>
+          <a:p>
+            <a:r>
+              <a:rPr lang="fr-CH" dirty="0" smtClean="0"/>
+              <a:t>    - identifier la provenance des bugs occasionnés</a:t>
+            </a:r>
+            <a:endParaRPr lang="fr-CH" dirty="0"/>
+          </a:p>
+        </p:txBody>
+      </p:sp>
+      <p:sp>
+        <p:nvSpPr>
+          <p:cNvPr id="4" name="Espace réservé du numéro de diapositive 3"/>
+          <p:cNvSpPr>
+            <a:spLocks noGrp="1"/>
+          </p:cNvSpPr>
+          <p:nvPr>
+            <p:ph type="sldNum" sz="quarter" idx="10"/>
+          </p:nvPr>
+        </p:nvSpPr>
+        <p:spPr/>
+        <p:txBody>
+          <a:bodyPr/>
+          <a:lstStyle/>
+          <a:p>
+            <a:fld id="{135558CC-D944-408D-80C8-CC88573B5A11}" type="slidenum">
+              <a:rPr lang="fr-CH" smtClean="0"/>
+              <a:t>6</a:t>
+            </a:fld>
+            <a:endParaRPr lang="fr-CH" dirty="0"/>
+          </a:p>
+        </p:txBody>
+      </p:sp>
+    </p:spTree>
+    <p:extLst>
+      <p:ext uri="{BB962C8B-B14F-4D97-AF65-F5344CB8AC3E}">
+        <p14:creationId xmlns:p14="http://schemas.microsoft.com/office/powerpoint/2010/main" val="1596446032"/>
+      </p:ext>
+    </p:extLst>
+  </p:cSld>
+  <p:clrMapOvr>
+    <a:masterClrMapping/>
+  </p:clrMapOvr>
+</p:notes>
+</file>
+
+<file path=ppt/notesSlides/notesSlide7.xml><?xml version="1.0" encoding="utf-8"?>
+<p:notes xmlns:a="http://schemas.openxmlformats.org/drawingml/2006/main" xmlns:r="http://schemas.openxmlformats.org/officeDocument/2006/relationships" xmlns:p="http://schemas.openxmlformats.org/presentationml/2006/main">
+  <p:cSld>
+    <p:spTree>
+      <p:nvGrpSpPr>
+        <p:cNvPr id="1" name=""/>
+        <p:cNvGrpSpPr/>
+        <p:nvPr/>
+      </p:nvGrpSpPr>
+      <p:grpSpPr>
+        <a:xfrm>
+          <a:off x="0" y="0"/>
+          <a:ext cx="0" cy="0"/>
+          <a:chOff x="0" y="0"/>
+          <a:chExt cx="0" cy="0"/>
+        </a:xfrm>
+      </p:grpSpPr>
+      <p:sp>
+        <p:nvSpPr>
+          <p:cNvPr id="2" name="Espace réservé de l'image des diapositives 1"/>
+          <p:cNvSpPr>
+            <a:spLocks noGrp="1" noRot="1" noChangeAspect="1"/>
+          </p:cNvSpPr>
+          <p:nvPr>
+            <p:ph type="sldImg"/>
+          </p:nvPr>
+        </p:nvSpPr>
+        <p:spPr/>
+      </p:sp>
+      <p:sp>
+        <p:nvSpPr>
+          <p:cNvPr id="3" name="Espace réservé des commentaires 2"/>
+          <p:cNvSpPr>
+            <a:spLocks noGrp="1"/>
+          </p:cNvSpPr>
+          <p:nvPr>
+            <p:ph type="body" idx="1"/>
+          </p:nvPr>
+        </p:nvSpPr>
+        <p:spPr/>
+        <p:txBody>
+          <a:bodyPr/>
+          <a:lstStyle/>
+          <a:p>
+            <a:r>
+              <a:rPr lang="fr-CH" dirty="0" smtClean="0"/>
               <a:t>Certains algorithmes retournent</a:t>
             </a:r>
             <a:r>
@@ -1206,6 +1370,98 @@
     <p:extLst>
       <p:ext uri="{BB962C8B-B14F-4D97-AF65-F5344CB8AC3E}">
         <p14:creationId xmlns:p14="http://schemas.microsoft.com/office/powerpoint/2010/main" val="2800087807"/>
+      </p:ext>
+    </p:extLst>
+  </p:cSld>
+  <p:clrMapOvr>
+    <a:masterClrMapping/>
+  </p:clrMapOvr>
+</p:notes>
+</file>
+
+<file path=ppt/notesSlides/notesSlide8.xml><?xml version="1.0" encoding="utf-8"?>
+<p:notes xmlns:a="http://schemas.openxmlformats.org/drawingml/2006/main" xmlns:r="http://schemas.openxmlformats.org/officeDocument/2006/relationships" xmlns:p="http://schemas.openxmlformats.org/presentationml/2006/main">
+  <p:cSld>
+    <p:spTree>
+      <p:nvGrpSpPr>
+        <p:cNvPr id="1" name=""/>
+        <p:cNvGrpSpPr/>
+        <p:nvPr/>
+      </p:nvGrpSpPr>
+      <p:grpSpPr>
+        <a:xfrm>
+          <a:off x="0" y="0"/>
+          <a:ext cx="0" cy="0"/>
+          <a:chOff x="0" y="0"/>
+          <a:chExt cx="0" cy="0"/>
+        </a:xfrm>
+      </p:grpSpPr>
+      <p:sp>
+        <p:nvSpPr>
+          <p:cNvPr id="2" name="Slide Image Placeholder 1"/>
+          <p:cNvSpPr>
+            <a:spLocks noGrp="1" noRot="1" noChangeAspect="1"/>
+          </p:cNvSpPr>
+          <p:nvPr>
+            <p:ph type="sldImg"/>
+          </p:nvPr>
+        </p:nvSpPr>
+        <p:spPr/>
+      </p:sp>
+      <p:sp>
+        <p:nvSpPr>
+          <p:cNvPr id="3" name="Notes Placeholder 2"/>
+          <p:cNvSpPr>
+            <a:spLocks noGrp="1"/>
+          </p:cNvSpPr>
+          <p:nvPr>
+            <p:ph type="body" idx="1"/>
+          </p:nvPr>
+        </p:nvSpPr>
+        <p:spPr/>
+        <p:txBody>
+          <a:bodyPr/>
+          <a:lstStyle/>
+          <a:p>
+            <a:r>
+              <a:rPr lang="fr-FR" dirty="0" smtClean="0"/>
+              <a:t>Bugs -&gt; liés</a:t>
+            </a:r>
+            <a:r>
+              <a:rPr lang="fr-FR" baseline="0" dirty="0" smtClean="0"/>
+              <a:t> à la nature de l’application OUVERT</a:t>
+            </a:r>
+            <a:endParaRPr lang="fr-FR" dirty="0"/>
+          </a:p>
+        </p:txBody>
+      </p:sp>
+      <p:sp>
+        <p:nvSpPr>
+          <p:cNvPr id="4" name="Slide Number Placeholder 3"/>
+          <p:cNvSpPr>
+            <a:spLocks noGrp="1"/>
+          </p:cNvSpPr>
+          <p:nvPr>
+            <p:ph type="sldNum" sz="quarter" idx="10"/>
+          </p:nvPr>
+        </p:nvSpPr>
+        <p:spPr/>
+        <p:txBody>
+          <a:bodyPr/>
+          <a:lstStyle/>
+          <a:p>
+            <a:fld id="{135558CC-D944-408D-80C8-CC88573B5A11}" type="slidenum">
+              <a:rPr lang="fr-CH" smtClean="0"/>
+              <a:t>9</a:t>
+            </a:fld>
+            <a:endParaRPr lang="fr-CH" dirty="0"/>
+          </a:p>
+        </p:txBody>
+      </p:sp>
+    </p:spTree>
+    <p:extLst>
+      <p:ext uri="{BB962C8B-B14F-4D97-AF65-F5344CB8AC3E}">
+        <p14:creationId xmlns:p14="http://schemas.microsoft.com/office/powerpoint/2010/main" val="2942197959"/>
       </p:ext>
     </p:extLst>
   </p:cSld>
@@ -1381,7 +1637,7 @@
             <a:fld id="{D57F1E4F-1CFF-5643-939E-217C01CDF565}" type="slidenum">
               <a:rPr lang="en-US" smtClean="0"/>
               <a:pPr/>
-              <a:t>‹N°›</a:t>
+              <a:t>‹#›</a:t>
             </a:fld>
             <a:endParaRPr lang="en-US" dirty="0"/>
           </a:p>
@@ -1563,7 +1819,7 @@
             <a:fld id="{D57F1E4F-1CFF-5643-939E-217C01CDF565}" type="slidenum">
               <a:rPr lang="en-US" smtClean="0"/>
               <a:pPr/>
-              <a:t>‹N°›</a:t>
+              <a:t>‹#›</a:t>
             </a:fld>
             <a:endParaRPr lang="en-US" dirty="0"/>
           </a:p>
@@ -1748,7 +2004,7 @@
             <a:fld id="{D57F1E4F-1CFF-5643-939E-217C01CDF565}" type="slidenum">
               <a:rPr lang="en-US" smtClean="0"/>
               <a:pPr/>
-              <a:t>‹N°›</a:t>
+              <a:t>‹#›</a:t>
             </a:fld>
             <a:endParaRPr lang="en-US" dirty="0"/>
           </a:p>
@@ -1923,7 +2179,7 @@
             <a:fld id="{D57F1E4F-1CFF-5643-939E-217C01CDF565}" type="slidenum">
               <a:rPr lang="en-US" smtClean="0"/>
               <a:pPr/>
-              <a:t>‹N°›</a:t>
+              <a:t>‹#›</a:t>
             </a:fld>
             <a:endParaRPr lang="en-US" dirty="0"/>
           </a:p>
@@ -2216,7 +2472,7 @@
             <a:fld id="{D57F1E4F-1CFF-5643-939E-217C01CDF565}" type="slidenum">
               <a:rPr lang="en-US" smtClean="0"/>
               <a:pPr/>
-              <a:t>‹N°›</a:t>
+              <a:t>‹#›</a:t>
             </a:fld>
             <a:endParaRPr lang="en-US" dirty="0"/>
           </a:p>
@@ -2490,7 +2746,7 @@
             <a:fld id="{D57F1E4F-1CFF-5643-939E-217C01CDF565}" type="slidenum">
               <a:rPr lang="en-US" smtClean="0"/>
               <a:pPr/>
-              <a:t>‹N°›</a:t>
+              <a:t>‹#›</a:t>
             </a:fld>
             <a:endParaRPr lang="en-US" dirty="0"/>
           </a:p>
@@ -2879,7 +3135,7 @@
             <a:fld id="{D57F1E4F-1CFF-5643-939E-217C01CDF565}" type="slidenum">
               <a:rPr lang="en-US" smtClean="0"/>
               <a:pPr/>
-              <a:t>‹N°›</a:t>
+              <a:t>‹#›</a:t>
             </a:fld>
             <a:endParaRPr lang="en-US" dirty="0"/>
           </a:p>
@@ -3039,7 +3295,7 @@
             <a:fld id="{D57F1E4F-1CFF-5643-939E-217C01CDF565}" type="slidenum">
               <a:rPr lang="en-US" smtClean="0"/>
               <a:pPr/>
-              <a:t>‹N°›</a:t>
+              <a:t>‹#›</a:t>
             </a:fld>
             <a:endParaRPr lang="en-US" dirty="0"/>
           </a:p>
@@ -3199,7 +3455,7 @@
             <a:fld id="{D57F1E4F-1CFF-5643-939E-217C01CDF565}" type="slidenum">
               <a:rPr lang="en-US" smtClean="0"/>
               <a:pPr/>
-              <a:t>‹N°›</a:t>
+              <a:t>‹#›</a:t>
             </a:fld>
             <a:endParaRPr lang="en-US" dirty="0"/>
           </a:p>
@@ -3495,7 +3751,7 @@
             <a:fld id="{D57F1E4F-1CFF-5643-939E-217C01CDF565}" type="slidenum">
               <a:rPr lang="en-US" smtClean="0"/>
               <a:pPr/>
-              <a:t>‹N°›</a:t>
+              <a:t>‹#›</a:t>
             </a:fld>
             <a:endParaRPr lang="en-US" dirty="0"/>
           </a:p>
@@ -3764,7 +4020,7 @@
             <a:fld id="{D57F1E4F-1CFF-5643-939E-217C01CDF565}" type="slidenum">
               <a:rPr lang="en-US" smtClean="0"/>
               <a:pPr/>
-              <a:t>‹N°›</a:t>
+              <a:t>‹#›</a:t>
             </a:fld>
             <a:endParaRPr lang="en-US" dirty="0"/>
           </a:p>
@@ -4020,7 +4276,7 @@
             <a:fld id="{D57F1E4F-1CFF-5643-939E-217C01CDF565}" type="slidenum">
               <a:rPr lang="en-US" smtClean="0"/>
               <a:pPr/>
-              <a:t>‹N°›</a:t>
+              <a:t>‹#›</a:t>
             </a:fld>
             <a:endParaRPr lang="en-US" dirty="0"/>
           </a:p>
@@ -5941,8 +6197,9 @@
             <a:pPr lvl="1"/>
             <a:r>
               <a:rPr lang="fr-FR" dirty="0" smtClean="0"/>
-              <a:t>Satisfaits de l’application</a:t>
-            </a:r>
+              <a:t>Globalement satisfaits</a:t>
+            </a:r>
+            <a:endParaRPr lang="fr-FR" dirty="0" smtClean="0"/>
           </a:p>
           <a:p>
             <a:pPr lvl="2"/>
@@ -5955,8 +6212,26 @@
             <a:pPr lvl="1"/>
             <a:r>
               <a:rPr lang="fr-FR" dirty="0" smtClean="0"/>
-              <a:t>Couches indépendantes et réutilisables</a:t>
-            </a:r>
+              <a:t>Couches indépendantes et </a:t>
+            </a:r>
+            <a:r>
+              <a:rPr lang="fr-FR" dirty="0" smtClean="0"/>
+              <a:t>réutilisables</a:t>
+            </a:r>
+          </a:p>
+          <a:p>
+            <a:r>
+              <a:rPr lang="fr-FR" dirty="0"/>
+              <a:t>Planification</a:t>
+            </a:r>
+          </a:p>
+          <a:p>
+            <a:pPr lvl="1"/>
+            <a:r>
+              <a:rPr lang="fr-FR" dirty="0"/>
+              <a:t>Tâches personnelles pas assez parallélisées </a:t>
+            </a:r>
+            <a:endParaRPr lang="fr-FR" dirty="0" smtClean="0"/>
           </a:p>
           <a:p>
             <a:r>
@@ -5987,19 +6262,6 @@
             <a:r>
               <a:rPr lang="fr-FR" dirty="0" smtClean="0"/>
               <a:t> faire plus souvent</a:t>
-            </a:r>
-          </a:p>
-          <a:p>
-            <a:r>
-              <a:rPr lang="fr-FR" dirty="0" smtClean="0"/>
-              <a:t>Planification</a:t>
-            </a:r>
-          </a:p>
-          <a:p>
-            <a:pPr lvl="1"/>
-            <a:r>
-              <a:rPr lang="fr-FR" dirty="0" smtClean="0"/>
-              <a:t>Tâches personnelles pas assez parallélisées </a:t>
             </a:r>
           </a:p>
           <a:p>

</xml_diff>